<commit_message>
Hinweise zum LifeTest geaddet
</commit_message>
<xml_diff>
--- a/Vortrag.pptx
+++ b/Vortrag.pptx
@@ -12177,6 +12177,145 @@
 </p:notes>
 </file>
 
+<file path=ppt/notesSlides/notesSlide5.xml><?xml version="1.0" encoding="utf-8"?>
+<p:notes xmlns:a="http://schemas.openxmlformats.org/drawingml/2006/main" xmlns:r="http://schemas.openxmlformats.org/officeDocument/2006/relationships" xmlns:p="http://schemas.openxmlformats.org/presentationml/2006/main">
+  <p:cSld>
+    <p:spTree>
+      <p:nvGrpSpPr>
+        <p:cNvPr id="1" name=""/>
+        <p:cNvGrpSpPr/>
+        <p:nvPr/>
+      </p:nvGrpSpPr>
+      <p:grpSpPr>
+        <a:xfrm>
+          <a:off x="0" y="0"/>
+          <a:ext cx="0" cy="0"/>
+          <a:chOff x="0" y="0"/>
+          <a:chExt cx="0" cy="0"/>
+        </a:xfrm>
+      </p:grpSpPr>
+      <p:sp>
+        <p:nvSpPr>
+          <p:cNvPr id="2" name="Folienbildplatzhalter 1"/>
+          <p:cNvSpPr>
+            <a:spLocks noGrp="1" noRot="1" noChangeAspect="1"/>
+          </p:cNvSpPr>
+          <p:nvPr>
+            <p:ph type="sldImg"/>
+          </p:nvPr>
+        </p:nvSpPr>
+        <p:spPr/>
+      </p:sp>
+      <p:sp>
+        <p:nvSpPr>
+          <p:cNvPr id="3" name="Notizenplatzhalter 2"/>
+          <p:cNvSpPr>
+            <a:spLocks noGrp="1"/>
+          </p:cNvSpPr>
+          <p:nvPr>
+            <p:ph type="body" idx="1"/>
+          </p:nvPr>
+        </p:nvSpPr>
+        <p:spPr/>
+        <p:txBody>
+          <a:bodyPr/>
+          <a:lstStyle/>
+          <a:p>
+            <a:r>
+              <a:rPr lang="de-DE" dirty="0" err="1"/>
+              <a:t>john</a:t>
+            </a:r>
+            <a:r>
+              <a:rPr lang="de-DE" dirty="0"/>
+              <a:t> --wordlist=wordlist.txt password.txt</a:t>
+            </a:r>
+          </a:p>
+          <a:p>
+            <a:r>
+              <a:rPr lang="de-DE" dirty="0" err="1"/>
+              <a:t>rm</a:t>
+            </a:r>
+            <a:r>
+              <a:rPr lang="de-DE" dirty="0"/>
+              <a:t> ~/.</a:t>
+            </a:r>
+            <a:r>
+              <a:rPr lang="de-DE" dirty="0" err="1"/>
+              <a:t>john</a:t>
+            </a:r>
+            <a:r>
+              <a:rPr lang="de-DE" dirty="0"/>
+              <a:t>/john.pot </a:t>
+            </a:r>
+          </a:p>
+          <a:p>
+            <a:pPr marL="0" marR="0" lvl="0" indent="0" algn="l" defTabSz="914400" rtl="0" eaLnBrk="1" fontAlgn="auto" latinLnBrk="0" hangingPunct="1">
+              <a:lnSpc>
+                <a:spcPct val="100000"/>
+              </a:lnSpc>
+              <a:spcBef>
+                <a:spcPts val="0"/>
+              </a:spcBef>
+              <a:spcAft>
+                <a:spcPts val="0"/>
+              </a:spcAft>
+              <a:buClrTx/>
+              <a:buSzTx/>
+              <a:buFontTx/>
+              <a:buNone/>
+              <a:tabLst/>
+              <a:defRPr/>
+            </a:pPr>
+            <a:r>
+              <a:rPr lang="de-DE" dirty="0" err="1"/>
+              <a:t>john</a:t>
+            </a:r>
+            <a:r>
+              <a:rPr lang="de-DE" dirty="0"/>
+              <a:t> --wordlist=wordlist(ende).txt password.txt</a:t>
+            </a:r>
+          </a:p>
+          <a:p>
+            <a:endParaRPr lang="de-DE" dirty="0"/>
+          </a:p>
+        </p:txBody>
+      </p:sp>
+      <p:sp>
+        <p:nvSpPr>
+          <p:cNvPr id="4" name="Foliennummernplatzhalter 3"/>
+          <p:cNvSpPr>
+            <a:spLocks noGrp="1"/>
+          </p:cNvSpPr>
+          <p:nvPr>
+            <p:ph type="sldNum" sz="quarter" idx="10"/>
+          </p:nvPr>
+        </p:nvSpPr>
+        <p:spPr/>
+        <p:txBody>
+          <a:bodyPr/>
+          <a:lstStyle/>
+          <a:p>
+            <a:fld id="{B75DCF5E-718A-4A85-88E9-46AA16884760}" type="slidenum">
+              <a:rPr lang="de-DE" smtClean="0"/>
+              <a:t>11</a:t>
+            </a:fld>
+            <a:endParaRPr lang="de-DE"/>
+          </a:p>
+        </p:txBody>
+      </p:sp>
+    </p:spTree>
+    <p:extLst>
+      <p:ext uri="{BB962C8B-B14F-4D97-AF65-F5344CB8AC3E}">
+        <p14:creationId xmlns:p14="http://schemas.microsoft.com/office/powerpoint/2010/main" val="3133122333"/>
+      </p:ext>
+    </p:extLst>
+  </p:cSld>
+  <p:clrMapOvr>
+    <a:masterClrMapping/>
+  </p:clrMapOvr>
+</p:notes>
+</file>
+
 <file path=ppt/slideLayouts/slideLayout1.xml><?xml version="1.0" encoding="utf-8"?>
 <p:sldLayout xmlns:a="http://schemas.openxmlformats.org/drawingml/2006/main" xmlns:r="http://schemas.openxmlformats.org/officeDocument/2006/relationships" xmlns:p="http://schemas.openxmlformats.org/presentationml/2006/main" type="title" preserve="1">
   <p:cSld name="Titelfolie">
@@ -15605,7 +15744,7 @@
           <p:nvPr/>
         </p:nvPicPr>
         <p:blipFill>
-          <a:blip r:embed="rId2"/>
+          <a:blip r:embed="rId3"/>
           <a:stretch>
             <a:fillRect/>
           </a:stretch>
@@ -15635,7 +15774,7 @@
           <p:nvPr/>
         </p:nvPicPr>
         <p:blipFill>
-          <a:blip r:embed="rId3"/>
+          <a:blip r:embed="rId4"/>
           <a:stretch>
             <a:fillRect/>
           </a:stretch>
@@ -15976,7 +16115,7 @@
           <a:p>
             <a:r>
               <a:rPr lang="de-DE" dirty="0"/>
-              <a:t>Nichts verwenden was man leicht erraten kann, oder offensichtlich ist</a:t>
+              <a:t>Vermeiden von offensichtlichen Zusammenhängen</a:t>
             </a:r>
           </a:p>
         </p:txBody>
@@ -16300,12 +16439,12 @@
           <a:lstStyle/>
           <a:p>
             <a:r>
-              <a:rPr lang="de-DE"/>
-              <a:t>Rm</a:t>
+              <a:rPr lang="de-DE" dirty="0" err="1"/>
+              <a:t>rm</a:t>
             </a:r>
             <a:r>
               <a:rPr lang="de-DE" dirty="0"/>
-              <a:t> $JOHN/.</a:t>
+              <a:t> ~/.</a:t>
             </a:r>
             <a:r>
               <a:rPr lang="de-DE" dirty="0" err="1"/>

</xml_diff>

<commit_message>
Paar Änderungen/Animationen von mir waren weg
Hab sie wieder hinzugefügt.
</commit_message>
<xml_diff>
--- a/Vortrag.pptx
+++ b/Vortrag.pptx
@@ -129,10 +129,6 @@
     </p:ext>
   </p:extLst>
 </p:presentation>
-</file>
-
-<file path=ppt/revisionInfo.xml><?xml version="1.0" encoding="utf-8"?>
-<p1510:revInfo xmlns:a="http://schemas.openxmlformats.org/drawingml/2006/main" xmlns:r="http://schemas.openxmlformats.org/officeDocument/2006/relationships" xmlns:p1510="http://schemas.microsoft.com/office/powerpoint/2015/10/main"/>
 </file>
 
 <file path=ppt/diagrams/colors1.xml><?xml version="1.0" encoding="utf-8"?>
@@ -6943,7 +6939,7 @@
           <a:p>
             <a:fld id="{EE61B14C-411D-4E53-BF32-B962F5A14F2D}" type="datetimeFigureOut">
               <a:rPr lang="de-DE" smtClean="0"/>
-              <a:t>20.05.2018</a:t>
+              <a:t>21.05.2018</a:t>
             </a:fld>
             <a:endParaRPr lang="de-DE"/>
           </a:p>
@@ -8884,7 +8880,7 @@
           <a:p>
             <a:fld id="{56DC4D02-6C89-4F53-8C73-2E69B56DDD08}" type="datetimeFigureOut">
               <a:rPr lang="de-DE" smtClean="0"/>
-              <a:t>20.05.2018</a:t>
+              <a:t>21.05.2018</a:t>
             </a:fld>
             <a:endParaRPr lang="de-DE"/>
           </a:p>
@@ -9135,7 +9131,7 @@
           <a:p>
             <a:fld id="{56DC4D02-6C89-4F53-8C73-2E69B56DDD08}" type="datetimeFigureOut">
               <a:rPr lang="de-DE" smtClean="0"/>
-              <a:t>20.05.2018</a:t>
+              <a:t>21.05.2018</a:t>
             </a:fld>
             <a:endParaRPr lang="de-DE"/>
           </a:p>
@@ -9449,7 +9445,7 @@
           <a:p>
             <a:fld id="{56DC4D02-6C89-4F53-8C73-2E69B56DDD08}" type="datetimeFigureOut">
               <a:rPr lang="de-DE" smtClean="0"/>
-              <a:t>20.05.2018</a:t>
+              <a:t>21.05.2018</a:t>
             </a:fld>
             <a:endParaRPr lang="de-DE"/>
           </a:p>
@@ -9776,7 +9772,7 @@
           <a:p>
             <a:fld id="{56DC4D02-6C89-4F53-8C73-2E69B56DDD08}" type="datetimeFigureOut">
               <a:rPr lang="de-DE" smtClean="0"/>
-              <a:t>20.05.2018</a:t>
+              <a:t>21.05.2018</a:t>
             </a:fld>
             <a:endParaRPr lang="de-DE"/>
           </a:p>
@@ -10090,7 +10086,7 @@
           <a:p>
             <a:fld id="{56DC4D02-6C89-4F53-8C73-2E69B56DDD08}" type="datetimeFigureOut">
               <a:rPr lang="de-DE" smtClean="0"/>
-              <a:t>20.05.2018</a:t>
+              <a:t>21.05.2018</a:t>
             </a:fld>
             <a:endParaRPr lang="de-DE"/>
           </a:p>
@@ -10477,7 +10473,7 @@
           <a:p>
             <a:fld id="{56DC4D02-6C89-4F53-8C73-2E69B56DDD08}" type="datetimeFigureOut">
               <a:rPr lang="de-DE" smtClean="0"/>
-              <a:t>20.05.2018</a:t>
+              <a:t>21.05.2018</a:t>
             </a:fld>
             <a:endParaRPr lang="de-DE"/>
           </a:p>
@@ -10647,7 +10643,7 @@
           <a:p>
             <a:fld id="{56DC4D02-6C89-4F53-8C73-2E69B56DDD08}" type="datetimeFigureOut">
               <a:rPr lang="de-DE" smtClean="0"/>
-              <a:t>20.05.2018</a:t>
+              <a:t>21.05.2018</a:t>
             </a:fld>
             <a:endParaRPr lang="de-DE"/>
           </a:p>
@@ -10827,7 +10823,7 @@
           <a:p>
             <a:fld id="{56DC4D02-6C89-4F53-8C73-2E69B56DDD08}" type="datetimeFigureOut">
               <a:rPr lang="de-DE" smtClean="0"/>
-              <a:t>20.05.2018</a:t>
+              <a:t>21.05.2018</a:t>
             </a:fld>
             <a:endParaRPr lang="de-DE"/>
           </a:p>
@@ -11003,7 +10999,7 @@
           <a:p>
             <a:fld id="{56DC4D02-6C89-4F53-8C73-2E69B56DDD08}" type="datetimeFigureOut">
               <a:rPr lang="de-DE" smtClean="0"/>
-              <a:t>20.05.2018</a:t>
+              <a:t>21.05.2018</a:t>
             </a:fld>
             <a:endParaRPr lang="de-DE"/>
           </a:p>
@@ -11250,7 +11246,7 @@
           <a:p>
             <a:fld id="{56DC4D02-6C89-4F53-8C73-2E69B56DDD08}" type="datetimeFigureOut">
               <a:rPr lang="de-DE" smtClean="0"/>
-              <a:t>20.05.2018</a:t>
+              <a:t>21.05.2018</a:t>
             </a:fld>
             <a:endParaRPr lang="de-DE"/>
           </a:p>
@@ -11482,7 +11478,7 @@
           <a:p>
             <a:fld id="{56DC4D02-6C89-4F53-8C73-2E69B56DDD08}" type="datetimeFigureOut">
               <a:rPr lang="de-DE" smtClean="0"/>
-              <a:t>20.05.2018</a:t>
+              <a:t>21.05.2018</a:t>
             </a:fld>
             <a:endParaRPr lang="de-DE"/>
           </a:p>
@@ -11861,7 +11857,7 @@
           <a:p>
             <a:fld id="{56DC4D02-6C89-4F53-8C73-2E69B56DDD08}" type="datetimeFigureOut">
               <a:rPr lang="de-DE" smtClean="0"/>
-              <a:t>20.05.2018</a:t>
+              <a:t>21.05.2018</a:t>
             </a:fld>
             <a:endParaRPr lang="de-DE"/>
           </a:p>
@@ -11989,7 +11985,7 @@
           <a:p>
             <a:fld id="{56DC4D02-6C89-4F53-8C73-2E69B56DDD08}" type="datetimeFigureOut">
               <a:rPr lang="de-DE" smtClean="0"/>
-              <a:t>20.05.2018</a:t>
+              <a:t>21.05.2018</a:t>
             </a:fld>
             <a:endParaRPr lang="de-DE"/>
           </a:p>
@@ -12084,7 +12080,7 @@
           <a:p>
             <a:fld id="{56DC4D02-6C89-4F53-8C73-2E69B56DDD08}" type="datetimeFigureOut">
               <a:rPr lang="de-DE" smtClean="0"/>
-              <a:t>20.05.2018</a:t>
+              <a:t>21.05.2018</a:t>
             </a:fld>
             <a:endParaRPr lang="de-DE"/>
           </a:p>
@@ -12339,7 +12335,7 @@
           <a:p>
             <a:fld id="{56DC4D02-6C89-4F53-8C73-2E69B56DDD08}" type="datetimeFigureOut">
               <a:rPr lang="de-DE" smtClean="0"/>
-              <a:t>20.05.2018</a:t>
+              <a:t>21.05.2018</a:t>
             </a:fld>
             <a:endParaRPr lang="de-DE"/>
           </a:p>
@@ -12607,7 +12603,7 @@
           <a:p>
             <a:fld id="{56DC4D02-6C89-4F53-8C73-2E69B56DDD08}" type="datetimeFigureOut">
               <a:rPr lang="de-DE" smtClean="0"/>
-              <a:t>20.05.2018</a:t>
+              <a:t>21.05.2018</a:t>
             </a:fld>
             <a:endParaRPr lang="de-DE"/>
           </a:p>
@@ -13352,7 +13348,7 @@
           <a:p>
             <a:fld id="{56DC4D02-6C89-4F53-8C73-2E69B56DDD08}" type="datetimeFigureOut">
               <a:rPr lang="de-DE" smtClean="0"/>
-              <a:t>20.05.2018</a:t>
+              <a:t>21.05.2018</a:t>
             </a:fld>
             <a:endParaRPr lang="de-DE"/>
           </a:p>
@@ -25567,14 +25563,16 @@
             <p:ph idx="1"/>
           </p:nvPr>
         </p:nvSpPr>
-        <p:spPr/>
+        <p:spPr>
+          <a:xfrm>
+            <a:off x="677334" y="1231641"/>
+            <a:ext cx="8596668" cy="4809722"/>
+          </a:xfrm>
+        </p:spPr>
         <p:txBody>
           <a:bodyPr/>
           <a:lstStyle/>
           <a:p>
-            <a:pPr marL="0" indent="0">
-              <a:buNone/>
-            </a:pPr>
             <a:r>
               <a:rPr lang="de-DE" dirty="0" err="1"/>
               <a:t>Brute</a:t>
@@ -25591,18 +25589,13 @@
             <a:endParaRPr lang="de-DE" dirty="0"/>
           </a:p>
           <a:p>
-            <a:pPr marL="0" indent="0">
-              <a:buNone/>
-            </a:pPr>
             <a:r>
               <a:rPr lang="de-DE" dirty="0"/>
               <a:t>Schutz:</a:t>
             </a:r>
           </a:p>
           <a:p>
-            <a:pPr marL="0" indent="0">
-              <a:buNone/>
-            </a:pPr>
+            <a:pPr lvl="1"/>
             <a:r>
               <a:rPr lang="de-DE" dirty="0"/>
               <a:t>Lange Schlüssel und komplexe Passwörter</a:t>

</xml_diff>

<commit_message>
JPG in allen Folien eingefügt
JohnTheRipper!
</commit_message>
<xml_diff>
--- a/Vortrag.pptx
+++ b/Vortrag.pptx
@@ -13941,6 +13941,42 @@
           </a:p>
         </p:txBody>
       </p:sp>
+      <p:pic>
+        <p:nvPicPr>
+          <p:cNvPr id="6" name="Grafik 5">
+            <a:extLst>
+              <a:ext uri="{FF2B5EF4-FFF2-40B4-BE49-F238E27FC236}">
+                <a16:creationId xmlns:a16="http://schemas.microsoft.com/office/drawing/2014/main" id="{F18C28C9-1EC6-4B56-939F-813C45D7CF14}"/>
+              </a:ext>
+            </a:extLst>
+          </p:cNvPr>
+          <p:cNvPicPr>
+            <a:picLocks noChangeAspect="1"/>
+          </p:cNvPicPr>
+          <p:nvPr/>
+        </p:nvPicPr>
+        <p:blipFill>
+          <a:blip r:embed="rId3">
+            <a:extLst>
+              <a:ext uri="{28A0092B-C50C-407E-A947-70E740481C1C}">
+                <a14:useLocalDpi xmlns:a14="http://schemas.microsoft.com/office/drawing/2010/main" val="0"/>
+              </a:ext>
+            </a:extLst>
+          </a:blip>
+          <a:stretch>
+            <a:fillRect/>
+          </a:stretch>
+        </p:blipFill>
+        <p:spPr>
+          <a:xfrm>
+            <a:off x="5390535" y="632340"/>
+            <a:ext cx="2449286" cy="2595344"/>
+          </a:xfrm>
+          <a:prstGeom prst="rect">
+            <a:avLst/>
+          </a:prstGeom>
+        </p:spPr>
+      </p:pic>
     </p:spTree>
     <p:extLst>
       <p:ext uri="{BB962C8B-B14F-4D97-AF65-F5344CB8AC3E}">
@@ -14178,6 +14214,42 @@
           <a:xfrm>
             <a:off x="941890" y="3260121"/>
             <a:ext cx="10401045" cy="4394207"/>
+          </a:xfrm>
+          <a:prstGeom prst="rect">
+            <a:avLst/>
+          </a:prstGeom>
+        </p:spPr>
+      </p:pic>
+      <p:pic>
+        <p:nvPicPr>
+          <p:cNvPr id="10" name="Grafik 9">
+            <a:extLst>
+              <a:ext uri="{FF2B5EF4-FFF2-40B4-BE49-F238E27FC236}">
+                <a16:creationId xmlns:a16="http://schemas.microsoft.com/office/drawing/2014/main" id="{48B7515B-AB39-4FC5-A888-0E8902802870}"/>
+              </a:ext>
+            </a:extLst>
+          </p:cNvPr>
+          <p:cNvPicPr>
+            <a:picLocks noChangeAspect="1"/>
+          </p:cNvPicPr>
+          <p:nvPr/>
+        </p:nvPicPr>
+        <p:blipFill>
+          <a:blip r:embed="rId6">
+            <a:extLst>
+              <a:ext uri="{28A0092B-C50C-407E-A947-70E740481C1C}">
+                <a14:useLocalDpi xmlns:a14="http://schemas.microsoft.com/office/drawing/2010/main" val="0"/>
+              </a:ext>
+            </a:extLst>
+          </a:blip>
+          <a:stretch>
+            <a:fillRect/>
+          </a:stretch>
+        </p:blipFill>
+        <p:spPr>
+          <a:xfrm>
+            <a:off x="0" y="0"/>
+            <a:ext cx="713247" cy="755780"/>
           </a:xfrm>
           <a:prstGeom prst="rect">
             <a:avLst/>
@@ -15360,6 +15432,42 @@
           </a:prstGeom>
         </p:spPr>
       </p:pic>
+      <p:pic>
+        <p:nvPicPr>
+          <p:cNvPr id="10" name="Grafik 9">
+            <a:extLst>
+              <a:ext uri="{FF2B5EF4-FFF2-40B4-BE49-F238E27FC236}">
+                <a16:creationId xmlns:a16="http://schemas.microsoft.com/office/drawing/2014/main" id="{DFC475BD-9DA6-4E9D-B528-B175815B5BAC}"/>
+              </a:ext>
+            </a:extLst>
+          </p:cNvPr>
+          <p:cNvPicPr>
+            <a:picLocks noChangeAspect="1"/>
+          </p:cNvPicPr>
+          <p:nvPr/>
+        </p:nvPicPr>
+        <p:blipFill>
+          <a:blip r:embed="rId6">
+            <a:extLst>
+              <a:ext uri="{28A0092B-C50C-407E-A947-70E740481C1C}">
+                <a14:useLocalDpi xmlns:a14="http://schemas.microsoft.com/office/drawing/2010/main" val="0"/>
+              </a:ext>
+            </a:extLst>
+          </a:blip>
+          <a:stretch>
+            <a:fillRect/>
+          </a:stretch>
+        </p:blipFill>
+        <p:spPr>
+          <a:xfrm>
+            <a:off x="0" y="0"/>
+            <a:ext cx="713247" cy="755780"/>
+          </a:xfrm>
+          <a:prstGeom prst="rect">
+            <a:avLst/>
+          </a:prstGeom>
+        </p:spPr>
+      </p:pic>
     </p:spTree>
     <p:extLst>
       <p:ext uri="{BB962C8B-B14F-4D97-AF65-F5344CB8AC3E}">
@@ -16608,6 +16716,42 @@
           </a:p>
         </p:txBody>
       </p:sp>
+      <p:pic>
+        <p:nvPicPr>
+          <p:cNvPr id="8" name="Grafik 7">
+            <a:extLst>
+              <a:ext uri="{FF2B5EF4-FFF2-40B4-BE49-F238E27FC236}">
+                <a16:creationId xmlns:a16="http://schemas.microsoft.com/office/drawing/2014/main" id="{DE03A67B-EFE6-4AD4-B3E4-0C048F468891}"/>
+              </a:ext>
+            </a:extLst>
+          </p:cNvPr>
+          <p:cNvPicPr>
+            <a:picLocks noChangeAspect="1"/>
+          </p:cNvPicPr>
+          <p:nvPr/>
+        </p:nvPicPr>
+        <p:blipFill>
+          <a:blip r:embed="rId5">
+            <a:extLst>
+              <a:ext uri="{28A0092B-C50C-407E-A947-70E740481C1C}">
+                <a14:useLocalDpi xmlns:a14="http://schemas.microsoft.com/office/drawing/2010/main" val="0"/>
+              </a:ext>
+            </a:extLst>
+          </a:blip>
+          <a:stretch>
+            <a:fillRect/>
+          </a:stretch>
+        </p:blipFill>
+        <p:spPr>
+          <a:xfrm>
+            <a:off x="0" y="0"/>
+            <a:ext cx="713247" cy="755780"/>
+          </a:xfrm>
+          <a:prstGeom prst="rect">
+            <a:avLst/>
+          </a:prstGeom>
+        </p:spPr>
+      </p:pic>
     </p:spTree>
     <p:extLst>
       <p:ext uri="{BB962C8B-B14F-4D97-AF65-F5344CB8AC3E}">
@@ -17335,6 +17479,42 @@
           </a:p>
         </p:txBody>
       </p:sp>
+      <p:pic>
+        <p:nvPicPr>
+          <p:cNvPr id="4" name="Grafik 3">
+            <a:extLst>
+              <a:ext uri="{FF2B5EF4-FFF2-40B4-BE49-F238E27FC236}">
+                <a16:creationId xmlns:a16="http://schemas.microsoft.com/office/drawing/2014/main" id="{4E7872E0-502E-4BDD-B612-CED129E567A1}"/>
+              </a:ext>
+            </a:extLst>
+          </p:cNvPr>
+          <p:cNvPicPr>
+            <a:picLocks noChangeAspect="1"/>
+          </p:cNvPicPr>
+          <p:nvPr/>
+        </p:nvPicPr>
+        <p:blipFill>
+          <a:blip r:embed="rId2">
+            <a:extLst>
+              <a:ext uri="{28A0092B-C50C-407E-A947-70E740481C1C}">
+                <a14:useLocalDpi xmlns:a14="http://schemas.microsoft.com/office/drawing/2010/main" val="0"/>
+              </a:ext>
+            </a:extLst>
+          </a:blip>
+          <a:stretch>
+            <a:fillRect/>
+          </a:stretch>
+        </p:blipFill>
+        <p:spPr>
+          <a:xfrm>
+            <a:off x="0" y="0"/>
+            <a:ext cx="713247" cy="755780"/>
+          </a:xfrm>
+          <a:prstGeom prst="rect">
+            <a:avLst/>
+          </a:prstGeom>
+        </p:spPr>
+      </p:pic>
     </p:spTree>
     <p:extLst>
       <p:ext uri="{BB962C8B-B14F-4D97-AF65-F5344CB8AC3E}">
@@ -17705,6 +17885,42 @@
           </a:p>
         </p:txBody>
       </p:sp>
+      <p:pic>
+        <p:nvPicPr>
+          <p:cNvPr id="4" name="Grafik 3">
+            <a:extLst>
+              <a:ext uri="{FF2B5EF4-FFF2-40B4-BE49-F238E27FC236}">
+                <a16:creationId xmlns:a16="http://schemas.microsoft.com/office/drawing/2014/main" id="{6F053A9C-47B0-429D-8F00-253E9BB89E81}"/>
+              </a:ext>
+            </a:extLst>
+          </p:cNvPr>
+          <p:cNvPicPr>
+            <a:picLocks noChangeAspect="1"/>
+          </p:cNvPicPr>
+          <p:nvPr/>
+        </p:nvPicPr>
+        <p:blipFill>
+          <a:blip r:embed="rId2">
+            <a:extLst>
+              <a:ext uri="{28A0092B-C50C-407E-A947-70E740481C1C}">
+                <a14:useLocalDpi xmlns:a14="http://schemas.microsoft.com/office/drawing/2010/main" val="0"/>
+              </a:ext>
+            </a:extLst>
+          </a:blip>
+          <a:stretch>
+            <a:fillRect/>
+          </a:stretch>
+        </p:blipFill>
+        <p:spPr>
+          <a:xfrm>
+            <a:off x="0" y="0"/>
+            <a:ext cx="713247" cy="755780"/>
+          </a:xfrm>
+          <a:prstGeom prst="rect">
+            <a:avLst/>
+          </a:prstGeom>
+        </p:spPr>
+      </p:pic>
     </p:spTree>
     <p:extLst>
       <p:ext uri="{BB962C8B-B14F-4D97-AF65-F5344CB8AC3E}">
@@ -18394,6 +18610,42 @@
           </a:p>
         </p:txBody>
       </p:sp>
+      <p:pic>
+        <p:nvPicPr>
+          <p:cNvPr id="8" name="Grafik 7">
+            <a:extLst>
+              <a:ext uri="{FF2B5EF4-FFF2-40B4-BE49-F238E27FC236}">
+                <a16:creationId xmlns:a16="http://schemas.microsoft.com/office/drawing/2014/main" id="{26A69A21-7E7D-4CF7-A1A2-174D55692CB4}"/>
+              </a:ext>
+            </a:extLst>
+          </p:cNvPr>
+          <p:cNvPicPr>
+            <a:picLocks noChangeAspect="1"/>
+          </p:cNvPicPr>
+          <p:nvPr/>
+        </p:nvPicPr>
+        <p:blipFill>
+          <a:blip r:embed="rId2">
+            <a:extLst>
+              <a:ext uri="{28A0092B-C50C-407E-A947-70E740481C1C}">
+                <a14:useLocalDpi xmlns:a14="http://schemas.microsoft.com/office/drawing/2010/main" val="0"/>
+              </a:ext>
+            </a:extLst>
+          </a:blip>
+          <a:stretch>
+            <a:fillRect/>
+          </a:stretch>
+        </p:blipFill>
+        <p:spPr>
+          <a:xfrm>
+            <a:off x="0" y="0"/>
+            <a:ext cx="713247" cy="755780"/>
+          </a:xfrm>
+          <a:prstGeom prst="rect">
+            <a:avLst/>
+          </a:prstGeom>
+        </p:spPr>
+      </p:pic>
     </p:spTree>
     <p:extLst>
       <p:ext uri="{BB962C8B-B14F-4D97-AF65-F5344CB8AC3E}">
@@ -18601,6 +18853,42 @@
           </a:p>
         </p:txBody>
       </p:sp>
+      <p:pic>
+        <p:nvPicPr>
+          <p:cNvPr id="4" name="Grafik 3">
+            <a:extLst>
+              <a:ext uri="{FF2B5EF4-FFF2-40B4-BE49-F238E27FC236}">
+                <a16:creationId xmlns:a16="http://schemas.microsoft.com/office/drawing/2014/main" id="{86745F15-5EC7-460E-A37D-7DCECC582EC3}"/>
+              </a:ext>
+            </a:extLst>
+          </p:cNvPr>
+          <p:cNvPicPr>
+            <a:picLocks noChangeAspect="1"/>
+          </p:cNvPicPr>
+          <p:nvPr/>
+        </p:nvPicPr>
+        <p:blipFill>
+          <a:blip r:embed="rId2">
+            <a:extLst>
+              <a:ext uri="{28A0092B-C50C-407E-A947-70E740481C1C}">
+                <a14:useLocalDpi xmlns:a14="http://schemas.microsoft.com/office/drawing/2010/main" val="0"/>
+              </a:ext>
+            </a:extLst>
+          </a:blip>
+          <a:stretch>
+            <a:fillRect/>
+          </a:stretch>
+        </p:blipFill>
+        <p:spPr>
+          <a:xfrm>
+            <a:off x="0" y="0"/>
+            <a:ext cx="713247" cy="755780"/>
+          </a:xfrm>
+          <a:prstGeom prst="rect">
+            <a:avLst/>
+          </a:prstGeom>
+        </p:spPr>
+      </p:pic>
     </p:spTree>
     <p:extLst>
       <p:ext uri="{BB962C8B-B14F-4D97-AF65-F5344CB8AC3E}">
@@ -18688,6 +18976,42 @@
           </a:p>
         </p:txBody>
       </p:sp>
+      <p:pic>
+        <p:nvPicPr>
+          <p:cNvPr id="4" name="Grafik 3">
+            <a:extLst>
+              <a:ext uri="{FF2B5EF4-FFF2-40B4-BE49-F238E27FC236}">
+                <a16:creationId xmlns:a16="http://schemas.microsoft.com/office/drawing/2014/main" id="{870F7988-CE6F-45A9-BAB2-AA9576EFE4B2}"/>
+              </a:ext>
+            </a:extLst>
+          </p:cNvPr>
+          <p:cNvPicPr>
+            <a:picLocks noChangeAspect="1"/>
+          </p:cNvPicPr>
+          <p:nvPr/>
+        </p:nvPicPr>
+        <p:blipFill>
+          <a:blip r:embed="rId2">
+            <a:extLst>
+              <a:ext uri="{28A0092B-C50C-407E-A947-70E740481C1C}">
+                <a14:useLocalDpi xmlns:a14="http://schemas.microsoft.com/office/drawing/2010/main" val="0"/>
+              </a:ext>
+            </a:extLst>
+          </a:blip>
+          <a:stretch>
+            <a:fillRect/>
+          </a:stretch>
+        </p:blipFill>
+        <p:spPr>
+          <a:xfrm>
+            <a:off x="0" y="0"/>
+            <a:ext cx="713247" cy="755780"/>
+          </a:xfrm>
+          <a:prstGeom prst="rect">
+            <a:avLst/>
+          </a:prstGeom>
+        </p:spPr>
+      </p:pic>
     </p:spTree>
     <p:extLst>
       <p:ext uri="{BB962C8B-B14F-4D97-AF65-F5344CB8AC3E}">
@@ -18871,6 +19195,42 @@
           </a:p>
         </p:txBody>
       </p:sp>
+      <p:pic>
+        <p:nvPicPr>
+          <p:cNvPr id="5" name="Grafik 4">
+            <a:extLst>
+              <a:ext uri="{FF2B5EF4-FFF2-40B4-BE49-F238E27FC236}">
+                <a16:creationId xmlns:a16="http://schemas.microsoft.com/office/drawing/2014/main" id="{BD7F8BCD-68D8-42C5-8D69-CFB162C25C5B}"/>
+              </a:ext>
+            </a:extLst>
+          </p:cNvPr>
+          <p:cNvPicPr>
+            <a:picLocks noChangeAspect="1"/>
+          </p:cNvPicPr>
+          <p:nvPr/>
+        </p:nvPicPr>
+        <p:blipFill>
+          <a:blip r:embed="rId2">
+            <a:extLst>
+              <a:ext uri="{28A0092B-C50C-407E-A947-70E740481C1C}">
+                <a14:useLocalDpi xmlns:a14="http://schemas.microsoft.com/office/drawing/2010/main" val="0"/>
+              </a:ext>
+            </a:extLst>
+          </a:blip>
+          <a:stretch>
+            <a:fillRect/>
+          </a:stretch>
+        </p:blipFill>
+        <p:spPr>
+          <a:xfrm>
+            <a:off x="0" y="0"/>
+            <a:ext cx="713247" cy="755780"/>
+          </a:xfrm>
+          <a:prstGeom prst="rect">
+            <a:avLst/>
+          </a:prstGeom>
+        </p:spPr>
+      </p:pic>
     </p:spTree>
     <p:extLst>
       <p:ext uri="{BB962C8B-B14F-4D97-AF65-F5344CB8AC3E}">
@@ -21378,6 +21738,42 @@
           </a:p>
         </p:txBody>
       </p:sp>
+      <p:pic>
+        <p:nvPicPr>
+          <p:cNvPr id="34" name="Grafik 33">
+            <a:extLst>
+              <a:ext uri="{FF2B5EF4-FFF2-40B4-BE49-F238E27FC236}">
+                <a16:creationId xmlns:a16="http://schemas.microsoft.com/office/drawing/2014/main" id="{F9A77987-3C8A-45C1-86CF-28526CCEF823}"/>
+              </a:ext>
+            </a:extLst>
+          </p:cNvPr>
+          <p:cNvPicPr>
+            <a:picLocks noChangeAspect="1"/>
+          </p:cNvPicPr>
+          <p:nvPr/>
+        </p:nvPicPr>
+        <p:blipFill>
+          <a:blip r:embed="rId17">
+            <a:extLst>
+              <a:ext uri="{28A0092B-C50C-407E-A947-70E740481C1C}">
+                <a14:useLocalDpi xmlns:a14="http://schemas.microsoft.com/office/drawing/2010/main" val="0"/>
+              </a:ext>
+            </a:extLst>
+          </a:blip>
+          <a:stretch>
+            <a:fillRect/>
+          </a:stretch>
+        </p:blipFill>
+        <p:spPr>
+          <a:xfrm>
+            <a:off x="0" y="0"/>
+            <a:ext cx="713247" cy="755780"/>
+          </a:xfrm>
+          <a:prstGeom prst="rect">
+            <a:avLst/>
+          </a:prstGeom>
+        </p:spPr>
+      </p:pic>
     </p:spTree>
     <p:extLst>
       <p:ext uri="{BB962C8B-B14F-4D97-AF65-F5344CB8AC3E}">
@@ -23097,6 +23493,42 @@
           </a:p>
         </p:txBody>
       </p:sp>
+      <p:pic>
+        <p:nvPicPr>
+          <p:cNvPr id="5" name="Grafik 4">
+            <a:extLst>
+              <a:ext uri="{FF2B5EF4-FFF2-40B4-BE49-F238E27FC236}">
+                <a16:creationId xmlns:a16="http://schemas.microsoft.com/office/drawing/2014/main" id="{719EAE8F-8349-4540-B8A3-0049BAA29981}"/>
+              </a:ext>
+            </a:extLst>
+          </p:cNvPr>
+          <p:cNvPicPr>
+            <a:picLocks noChangeAspect="1"/>
+          </p:cNvPicPr>
+          <p:nvPr/>
+        </p:nvPicPr>
+        <p:blipFill>
+          <a:blip r:embed="rId2">
+            <a:extLst>
+              <a:ext uri="{28A0092B-C50C-407E-A947-70E740481C1C}">
+                <a14:useLocalDpi xmlns:a14="http://schemas.microsoft.com/office/drawing/2010/main" val="0"/>
+              </a:ext>
+            </a:extLst>
+          </a:blip>
+          <a:stretch>
+            <a:fillRect/>
+          </a:stretch>
+        </p:blipFill>
+        <p:spPr>
+          <a:xfrm>
+            <a:off x="0" y="0"/>
+            <a:ext cx="713247" cy="755780"/>
+          </a:xfrm>
+          <a:prstGeom prst="rect">
+            <a:avLst/>
+          </a:prstGeom>
+        </p:spPr>
+      </p:pic>
     </p:spTree>
     <p:extLst>
       <p:ext uri="{BB962C8B-B14F-4D97-AF65-F5344CB8AC3E}">
@@ -23995,6 +24427,42 @@
           </a:p>
         </p:txBody>
       </p:sp>
+      <p:pic>
+        <p:nvPicPr>
+          <p:cNvPr id="5" name="Grafik 4">
+            <a:extLst>
+              <a:ext uri="{FF2B5EF4-FFF2-40B4-BE49-F238E27FC236}">
+                <a16:creationId xmlns:a16="http://schemas.microsoft.com/office/drawing/2014/main" id="{FBE93C77-C952-4441-A3A1-C28BFE645185}"/>
+              </a:ext>
+            </a:extLst>
+          </p:cNvPr>
+          <p:cNvPicPr>
+            <a:picLocks noChangeAspect="1"/>
+          </p:cNvPicPr>
+          <p:nvPr/>
+        </p:nvPicPr>
+        <p:blipFill>
+          <a:blip r:embed="rId3">
+            <a:extLst>
+              <a:ext uri="{28A0092B-C50C-407E-A947-70E740481C1C}">
+                <a14:useLocalDpi xmlns:a14="http://schemas.microsoft.com/office/drawing/2010/main" val="0"/>
+              </a:ext>
+            </a:extLst>
+          </a:blip>
+          <a:stretch>
+            <a:fillRect/>
+          </a:stretch>
+        </p:blipFill>
+        <p:spPr>
+          <a:xfrm>
+            <a:off x="0" y="0"/>
+            <a:ext cx="713247" cy="755780"/>
+          </a:xfrm>
+          <a:prstGeom prst="rect">
+            <a:avLst/>
+          </a:prstGeom>
+        </p:spPr>
+      </p:pic>
     </p:spTree>
     <p:extLst>
       <p:ext uri="{BB962C8B-B14F-4D97-AF65-F5344CB8AC3E}">
@@ -25081,6 +25549,42 @@
           </a:p>
         </p:txBody>
       </p:sp>
+      <p:pic>
+        <p:nvPicPr>
+          <p:cNvPr id="5" name="Grafik 4">
+            <a:extLst>
+              <a:ext uri="{FF2B5EF4-FFF2-40B4-BE49-F238E27FC236}">
+                <a16:creationId xmlns:a16="http://schemas.microsoft.com/office/drawing/2014/main" id="{D9D1310D-2480-4571-A35C-F0580324A083}"/>
+              </a:ext>
+            </a:extLst>
+          </p:cNvPr>
+          <p:cNvPicPr>
+            <a:picLocks noChangeAspect="1"/>
+          </p:cNvPicPr>
+          <p:nvPr/>
+        </p:nvPicPr>
+        <p:blipFill>
+          <a:blip r:embed="rId2">
+            <a:extLst>
+              <a:ext uri="{28A0092B-C50C-407E-A947-70E740481C1C}">
+                <a14:useLocalDpi xmlns:a14="http://schemas.microsoft.com/office/drawing/2010/main" val="0"/>
+              </a:ext>
+            </a:extLst>
+          </a:blip>
+          <a:stretch>
+            <a:fillRect/>
+          </a:stretch>
+        </p:blipFill>
+        <p:spPr>
+          <a:xfrm>
+            <a:off x="0" y="0"/>
+            <a:ext cx="713247" cy="755780"/>
+          </a:xfrm>
+          <a:prstGeom prst="rect">
+            <a:avLst/>
+          </a:prstGeom>
+        </p:spPr>
+      </p:pic>
     </p:spTree>
     <p:extLst>
       <p:ext uri="{BB962C8B-B14F-4D97-AF65-F5344CB8AC3E}">
@@ -25207,6 +25711,42 @@
           </a:p>
         </p:txBody>
       </p:sp>
+      <p:pic>
+        <p:nvPicPr>
+          <p:cNvPr id="5" name="Grafik 4">
+            <a:extLst>
+              <a:ext uri="{FF2B5EF4-FFF2-40B4-BE49-F238E27FC236}">
+                <a16:creationId xmlns:a16="http://schemas.microsoft.com/office/drawing/2014/main" id="{A59D0322-18F1-42F9-B8F6-5A96B6FD27CF}"/>
+              </a:ext>
+            </a:extLst>
+          </p:cNvPr>
+          <p:cNvPicPr>
+            <a:picLocks noChangeAspect="1"/>
+          </p:cNvPicPr>
+          <p:nvPr/>
+        </p:nvPicPr>
+        <p:blipFill>
+          <a:blip r:embed="rId2">
+            <a:extLst>
+              <a:ext uri="{28A0092B-C50C-407E-A947-70E740481C1C}">
+                <a14:useLocalDpi xmlns:a14="http://schemas.microsoft.com/office/drawing/2010/main" val="0"/>
+              </a:ext>
+            </a:extLst>
+          </a:blip>
+          <a:stretch>
+            <a:fillRect/>
+          </a:stretch>
+        </p:blipFill>
+        <p:spPr>
+          <a:xfrm>
+            <a:off x="0" y="0"/>
+            <a:ext cx="713247" cy="755780"/>
+          </a:xfrm>
+          <a:prstGeom prst="rect">
+            <a:avLst/>
+          </a:prstGeom>
+        </p:spPr>
+      </p:pic>
     </p:spTree>
     <p:extLst>
       <p:ext uri="{BB962C8B-B14F-4D97-AF65-F5344CB8AC3E}">
@@ -25603,6 +26143,42 @@
           </a:p>
         </p:txBody>
       </p:sp>
+      <p:pic>
+        <p:nvPicPr>
+          <p:cNvPr id="5" name="Grafik 4">
+            <a:extLst>
+              <a:ext uri="{FF2B5EF4-FFF2-40B4-BE49-F238E27FC236}">
+                <a16:creationId xmlns:a16="http://schemas.microsoft.com/office/drawing/2014/main" id="{42C49C69-D5AF-4838-B141-F13D71064D58}"/>
+              </a:ext>
+            </a:extLst>
+          </p:cNvPr>
+          <p:cNvPicPr>
+            <a:picLocks noChangeAspect="1"/>
+          </p:cNvPicPr>
+          <p:nvPr/>
+        </p:nvPicPr>
+        <p:blipFill>
+          <a:blip r:embed="rId3">
+            <a:extLst>
+              <a:ext uri="{28A0092B-C50C-407E-A947-70E740481C1C}">
+                <a14:useLocalDpi xmlns:a14="http://schemas.microsoft.com/office/drawing/2010/main" val="0"/>
+              </a:ext>
+            </a:extLst>
+          </a:blip>
+          <a:stretch>
+            <a:fillRect/>
+          </a:stretch>
+        </p:blipFill>
+        <p:spPr>
+          <a:xfrm>
+            <a:off x="0" y="0"/>
+            <a:ext cx="713247" cy="755780"/>
+          </a:xfrm>
+          <a:prstGeom prst="rect">
+            <a:avLst/>
+          </a:prstGeom>
+        </p:spPr>
+      </p:pic>
     </p:spTree>
     <p:extLst>
       <p:ext uri="{BB962C8B-B14F-4D97-AF65-F5344CB8AC3E}">
@@ -25858,6 +26434,42 @@
           <a:xfrm>
             <a:off x="838200" y="2743514"/>
             <a:ext cx="8556123" cy="3848922"/>
+          </a:xfrm>
+          <a:prstGeom prst="rect">
+            <a:avLst/>
+          </a:prstGeom>
+        </p:spPr>
+      </p:pic>
+      <p:pic>
+        <p:nvPicPr>
+          <p:cNvPr id="10" name="Grafik 9">
+            <a:extLst>
+              <a:ext uri="{FF2B5EF4-FFF2-40B4-BE49-F238E27FC236}">
+                <a16:creationId xmlns:a16="http://schemas.microsoft.com/office/drawing/2014/main" id="{A7B050ED-21DC-4B54-852A-77D86F3DC9FF}"/>
+              </a:ext>
+            </a:extLst>
+          </p:cNvPr>
+          <p:cNvPicPr>
+            <a:picLocks noChangeAspect="1"/>
+          </p:cNvPicPr>
+          <p:nvPr/>
+        </p:nvPicPr>
+        <p:blipFill>
+          <a:blip r:embed="rId6">
+            <a:extLst>
+              <a:ext uri="{28A0092B-C50C-407E-A947-70E740481C1C}">
+                <a14:useLocalDpi xmlns:a14="http://schemas.microsoft.com/office/drawing/2010/main" val="0"/>
+              </a:ext>
+            </a:extLst>
+          </a:blip>
+          <a:stretch>
+            <a:fillRect/>
+          </a:stretch>
+        </p:blipFill>
+        <p:spPr>
+          <a:xfrm>
+            <a:off x="0" y="0"/>
+            <a:ext cx="713247" cy="755780"/>
           </a:xfrm>
           <a:prstGeom prst="rect">
             <a:avLst/>

</xml_diff>

<commit_message>
kleinigkeit zu distributed John geaddet
</commit_message>
<xml_diff>
--- a/Vortrag.pptx
+++ b/Vortrag.pptx
@@ -129,6 +129,10 @@
     </p:ext>
   </p:extLst>
 </p:presentation>
+</file>
+
+<file path=ppt/revisionInfo.xml><?xml version="1.0" encoding="utf-8"?>
+<p1510:revInfo xmlns:a="http://schemas.openxmlformats.org/drawingml/2006/main" xmlns:r="http://schemas.openxmlformats.org/officeDocument/2006/relationships" xmlns:p1510="http://schemas.microsoft.com/office/powerpoint/2015/10/main"/>
 </file>
 
 <file path=ppt/diagrams/colors1.xml><?xml version="1.0" encoding="utf-8"?>
@@ -6939,7 +6943,7 @@
           <a:p>
             <a:fld id="{EE61B14C-411D-4E53-BF32-B962F5A14F2D}" type="datetimeFigureOut">
               <a:rPr lang="de-DE" smtClean="0"/>
-              <a:t>21.05.2018</a:t>
+              <a:t>22.05.2018</a:t>
             </a:fld>
             <a:endParaRPr lang="de-DE"/>
           </a:p>
@@ -8880,7 +8884,7 @@
           <a:p>
             <a:fld id="{56DC4D02-6C89-4F53-8C73-2E69B56DDD08}" type="datetimeFigureOut">
               <a:rPr lang="de-DE" smtClean="0"/>
-              <a:t>21.05.2018</a:t>
+              <a:t>22.05.2018</a:t>
             </a:fld>
             <a:endParaRPr lang="de-DE"/>
           </a:p>
@@ -9131,7 +9135,7 @@
           <a:p>
             <a:fld id="{56DC4D02-6C89-4F53-8C73-2E69B56DDD08}" type="datetimeFigureOut">
               <a:rPr lang="de-DE" smtClean="0"/>
-              <a:t>21.05.2018</a:t>
+              <a:t>22.05.2018</a:t>
             </a:fld>
             <a:endParaRPr lang="de-DE"/>
           </a:p>
@@ -9445,7 +9449,7 @@
           <a:p>
             <a:fld id="{56DC4D02-6C89-4F53-8C73-2E69B56DDD08}" type="datetimeFigureOut">
               <a:rPr lang="de-DE" smtClean="0"/>
-              <a:t>21.05.2018</a:t>
+              <a:t>22.05.2018</a:t>
             </a:fld>
             <a:endParaRPr lang="de-DE"/>
           </a:p>
@@ -9772,7 +9776,7 @@
           <a:p>
             <a:fld id="{56DC4D02-6C89-4F53-8C73-2E69B56DDD08}" type="datetimeFigureOut">
               <a:rPr lang="de-DE" smtClean="0"/>
-              <a:t>21.05.2018</a:t>
+              <a:t>22.05.2018</a:t>
             </a:fld>
             <a:endParaRPr lang="de-DE"/>
           </a:p>
@@ -10086,7 +10090,7 @@
           <a:p>
             <a:fld id="{56DC4D02-6C89-4F53-8C73-2E69B56DDD08}" type="datetimeFigureOut">
               <a:rPr lang="de-DE" smtClean="0"/>
-              <a:t>21.05.2018</a:t>
+              <a:t>22.05.2018</a:t>
             </a:fld>
             <a:endParaRPr lang="de-DE"/>
           </a:p>
@@ -10473,7 +10477,7 @@
           <a:p>
             <a:fld id="{56DC4D02-6C89-4F53-8C73-2E69B56DDD08}" type="datetimeFigureOut">
               <a:rPr lang="de-DE" smtClean="0"/>
-              <a:t>21.05.2018</a:t>
+              <a:t>22.05.2018</a:t>
             </a:fld>
             <a:endParaRPr lang="de-DE"/>
           </a:p>
@@ -10643,7 +10647,7 @@
           <a:p>
             <a:fld id="{56DC4D02-6C89-4F53-8C73-2E69B56DDD08}" type="datetimeFigureOut">
               <a:rPr lang="de-DE" smtClean="0"/>
-              <a:t>21.05.2018</a:t>
+              <a:t>22.05.2018</a:t>
             </a:fld>
             <a:endParaRPr lang="de-DE"/>
           </a:p>
@@ -10823,7 +10827,7 @@
           <a:p>
             <a:fld id="{56DC4D02-6C89-4F53-8C73-2E69B56DDD08}" type="datetimeFigureOut">
               <a:rPr lang="de-DE" smtClean="0"/>
-              <a:t>21.05.2018</a:t>
+              <a:t>22.05.2018</a:t>
             </a:fld>
             <a:endParaRPr lang="de-DE"/>
           </a:p>
@@ -10999,7 +11003,7 @@
           <a:p>
             <a:fld id="{56DC4D02-6C89-4F53-8C73-2E69B56DDD08}" type="datetimeFigureOut">
               <a:rPr lang="de-DE" smtClean="0"/>
-              <a:t>21.05.2018</a:t>
+              <a:t>22.05.2018</a:t>
             </a:fld>
             <a:endParaRPr lang="de-DE"/>
           </a:p>
@@ -11246,7 +11250,7 @@
           <a:p>
             <a:fld id="{56DC4D02-6C89-4F53-8C73-2E69B56DDD08}" type="datetimeFigureOut">
               <a:rPr lang="de-DE" smtClean="0"/>
-              <a:t>21.05.2018</a:t>
+              <a:t>22.05.2018</a:t>
             </a:fld>
             <a:endParaRPr lang="de-DE"/>
           </a:p>
@@ -11478,7 +11482,7 @@
           <a:p>
             <a:fld id="{56DC4D02-6C89-4F53-8C73-2E69B56DDD08}" type="datetimeFigureOut">
               <a:rPr lang="de-DE" smtClean="0"/>
-              <a:t>21.05.2018</a:t>
+              <a:t>22.05.2018</a:t>
             </a:fld>
             <a:endParaRPr lang="de-DE"/>
           </a:p>
@@ -11857,7 +11861,7 @@
           <a:p>
             <a:fld id="{56DC4D02-6C89-4F53-8C73-2E69B56DDD08}" type="datetimeFigureOut">
               <a:rPr lang="de-DE" smtClean="0"/>
-              <a:t>21.05.2018</a:t>
+              <a:t>22.05.2018</a:t>
             </a:fld>
             <a:endParaRPr lang="de-DE"/>
           </a:p>
@@ -11985,7 +11989,7 @@
           <a:p>
             <a:fld id="{56DC4D02-6C89-4F53-8C73-2E69B56DDD08}" type="datetimeFigureOut">
               <a:rPr lang="de-DE" smtClean="0"/>
-              <a:t>21.05.2018</a:t>
+              <a:t>22.05.2018</a:t>
             </a:fld>
             <a:endParaRPr lang="de-DE"/>
           </a:p>
@@ -12080,7 +12084,7 @@
           <a:p>
             <a:fld id="{56DC4D02-6C89-4F53-8C73-2E69B56DDD08}" type="datetimeFigureOut">
               <a:rPr lang="de-DE" smtClean="0"/>
-              <a:t>21.05.2018</a:t>
+              <a:t>22.05.2018</a:t>
             </a:fld>
             <a:endParaRPr lang="de-DE"/>
           </a:p>
@@ -12335,7 +12339,7 @@
           <a:p>
             <a:fld id="{56DC4D02-6C89-4F53-8C73-2E69B56DDD08}" type="datetimeFigureOut">
               <a:rPr lang="de-DE" smtClean="0"/>
-              <a:t>21.05.2018</a:t>
+              <a:t>22.05.2018</a:t>
             </a:fld>
             <a:endParaRPr lang="de-DE"/>
           </a:p>
@@ -12603,7 +12607,7 @@
           <a:p>
             <a:fld id="{56DC4D02-6C89-4F53-8C73-2E69B56DDD08}" type="datetimeFigureOut">
               <a:rPr lang="de-DE" smtClean="0"/>
-              <a:t>21.05.2018</a:t>
+              <a:t>22.05.2018</a:t>
             </a:fld>
             <a:endParaRPr lang="de-DE"/>
           </a:p>
@@ -13348,7 +13352,7 @@
           <a:p>
             <a:fld id="{56DC4D02-6C89-4F53-8C73-2E69B56DDD08}" type="datetimeFigureOut">
               <a:rPr lang="de-DE" smtClean="0"/>
-              <a:t>21.05.2018</a:t>
+              <a:t>22.05.2018</a:t>
             </a:fld>
             <a:endParaRPr lang="de-DE"/>
           </a:p>
@@ -18605,7 +18609,22 @@
           <a:p>
             <a:r>
               <a:rPr lang="de-DE" dirty="0"/>
-              <a:t>Seit Version 1.7.2 Möglichkeit der Multiprozessor Nutzung</a:t>
+              <a:t>Der Versuch John </a:t>
+            </a:r>
+            <a:r>
+              <a:rPr lang="de-DE" dirty="0" err="1"/>
+              <a:t>the</a:t>
+            </a:r>
+            <a:r>
+              <a:rPr lang="de-DE" dirty="0"/>
+              <a:t> Ripper über eine Server und Clientartige Struktur auf mehreren Systemen gegen die selben Hashwerte strukturiert laufen zu lassen</a:t>
+            </a:r>
+          </a:p>
+          <a:p>
+            <a:pPr lvl="1"/>
+            <a:r>
+              <a:rPr lang="de-DE" dirty="0"/>
+              <a:t>Wurde leider eingestellt</a:t>
             </a:r>
           </a:p>
         </p:txBody>

</xml_diff>